<commit_message>
Week 8 workshop slides
</commit_message>
<xml_diff>
--- a/COMP2x0-portfolio-workshop-08.pptx
+++ b/COMP2x0-portfolio-workshop-08.pptx
@@ -585,7 +585,7 @@
           <a:p>
             <a:fld id="{EA0C0817-A112-4847-8014-A94B7D2A4EA3}" type="datetime1">
               <a:rPr lang="en-US" smtClean="0"/>
-              <a:t>3/1/2020</a:t>
+              <a:t>3/16/2020</a:t>
             </a:fld>
             <a:endParaRPr lang="en-US" dirty="0"/>
           </a:p>
@@ -787,7 +787,7 @@
           <a:p>
             <a:fld id="{134F40B7-36AB-4376-BE14-EF7004D79BB9}" type="datetime1">
               <a:rPr lang="en-US" smtClean="0"/>
-              <a:t>3/1/2020</a:t>
+              <a:t>3/16/2020</a:t>
             </a:fld>
             <a:endParaRPr lang="en-US"/>
           </a:p>
@@ -967,7 +967,7 @@
           <a:p>
             <a:fld id="{FF87CAB8-DCAE-46A5-AADA-B3FAD11A54E0}" type="datetime1">
               <a:rPr lang="en-US" smtClean="0"/>
-              <a:t>3/1/2020</a:t>
+              <a:t>3/16/2020</a:t>
             </a:fld>
             <a:endParaRPr lang="en-US"/>
           </a:p>
@@ -1137,7 +1137,7 @@
           <a:p>
             <a:fld id="{7332B432-ACDA-4023-A761-2BAB76577B62}" type="datetime1">
               <a:rPr lang="en-US" smtClean="0"/>
-              <a:t>3/1/2020</a:t>
+              <a:t>3/16/2020</a:t>
             </a:fld>
             <a:endParaRPr lang="en-US"/>
           </a:p>
@@ -1736,7 +1736,7 @@
           <a:p>
             <a:fld id="{D9C646AA-F36E-4540-911D-FFFC0A0EF24A}" type="datetime1">
               <a:rPr lang="en-US" smtClean="0"/>
-              <a:t>3/1/2020</a:t>
+              <a:t>3/16/2020</a:t>
             </a:fld>
             <a:endParaRPr lang="en-US" dirty="0"/>
           </a:p>
@@ -2056,7 +2056,7 @@
           <a:p>
             <a:fld id="{69186D26-FA5F-4637-B602-B7C2DC34CFD4}" type="datetime1">
               <a:rPr lang="en-US" smtClean="0"/>
-              <a:t>3/1/2020</a:t>
+              <a:t>3/16/2020</a:t>
             </a:fld>
             <a:endParaRPr lang="en-US"/>
           </a:p>
@@ -2493,7 +2493,7 @@
           <a:p>
             <a:fld id="{8A7F15D8-96D1-4781-BC50-CA8A088B2FE4}" type="datetime1">
               <a:rPr lang="en-US" smtClean="0"/>
-              <a:t>3/1/2020</a:t>
+              <a:t>3/16/2020</a:t>
             </a:fld>
             <a:endParaRPr lang="en-US"/>
           </a:p>
@@ -2611,7 +2611,7 @@
           <a:p>
             <a:fld id="{F9A96C99-B8F8-4528-BD05-0E16E943DC09}" type="datetime1">
               <a:rPr lang="en-US" smtClean="0"/>
-              <a:t>3/1/2020</a:t>
+              <a:t>3/16/2020</a:t>
             </a:fld>
             <a:endParaRPr lang="en-US"/>
           </a:p>
@@ -2706,7 +2706,7 @@
           <a:p>
             <a:fld id="{03636942-C211-4B28-8DBD-C953E00AF71B}" type="datetime1">
               <a:rPr lang="en-US" smtClean="0"/>
-              <a:t>3/1/2020</a:t>
+              <a:t>3/16/2020</a:t>
             </a:fld>
             <a:endParaRPr lang="en-US"/>
           </a:p>
@@ -3123,7 +3123,7 @@
           <a:p>
             <a:fld id="{7E8D12A6-918A-48BD-8CB9-CA713993B0EA}" type="datetime1">
               <a:rPr lang="en-US" smtClean="0"/>
-              <a:t>3/1/2020</a:t>
+              <a:t>3/16/2020</a:t>
             </a:fld>
             <a:endParaRPr lang="en-US"/>
           </a:p>
@@ -3385,7 +3385,7 @@
             <a:fld id="{E778CE86-875F-4587-BCF6-FA054AFC0D53}" type="datetime1">
               <a:rPr lang="en-US" smtClean="0"/>
               <a:pPr/>
-              <a:t>3/1/2020</a:t>
+              <a:t>3/16/2020</a:t>
             </a:fld>
             <a:endParaRPr lang="en-US" dirty="0"/>
           </a:p>
@@ -3901,7 +3901,7 @@
           <a:p>
             <a:fld id="{F6FA2B21-3FCD-4721-B95C-427943F61125}" type="datetime1">
               <a:rPr lang="en-US" smtClean="0"/>
-              <a:t>3/1/2020</a:t>
+              <a:t>3/16/2020</a:t>
             </a:fld>
             <a:endParaRPr lang="en-US"/>
           </a:p>
@@ -5942,33 +5942,15 @@
                                   </p:childTnLst>
                                 </p:cTn>
                               </p:par>
-                            </p:childTnLst>
-                          </p:cTn>
-                        </p:par>
-                      </p:childTnLst>
-                    </p:cTn>
-                  </p:par>
-                  <p:par>
-                    <p:cTn id="13" fill="hold">
-                      <p:stCondLst>
-                        <p:cond delay="indefinite"/>
-                      </p:stCondLst>
-                      <p:childTnLst>
-                        <p:par>
-                          <p:cTn id="14" fill="hold">
-                            <p:stCondLst>
-                              <p:cond delay="0"/>
-                            </p:stCondLst>
-                            <p:childTnLst>
                               <p:par>
-                                <p:cTn id="15" presetID="1" presetClass="entr" presetSubtype="0" fill="hold" nodeType="clickEffect">
+                                <p:cTn id="13" presetID="1" presetClass="entr" presetSubtype="0" fill="hold" nodeType="withEffect">
                                   <p:stCondLst>
                                     <p:cond delay="0"/>
                                   </p:stCondLst>
                                   <p:childTnLst>
                                     <p:set>
                                       <p:cBhvr>
-                                        <p:cTn id="16" dur="1" fill="hold">
+                                        <p:cTn id="14" dur="1" fill="hold">
                                           <p:stCondLst>
                                             <p:cond delay="0"/>
                                           </p:stCondLst>
@@ -5998,26 +5980,26 @@
                     </p:cTn>
                   </p:par>
                   <p:par>
-                    <p:cTn id="17" fill="hold">
+                    <p:cTn id="15" fill="hold">
                       <p:stCondLst>
                         <p:cond delay="indefinite"/>
                       </p:stCondLst>
                       <p:childTnLst>
                         <p:par>
-                          <p:cTn id="18" fill="hold">
+                          <p:cTn id="16" fill="hold">
                             <p:stCondLst>
                               <p:cond delay="0"/>
                             </p:stCondLst>
                             <p:childTnLst>
                               <p:par>
-                                <p:cTn id="19" presetID="1" presetClass="entr" presetSubtype="0" fill="hold" nodeType="clickEffect">
+                                <p:cTn id="17" presetID="1" presetClass="entr" presetSubtype="0" fill="hold" nodeType="clickEffect">
                                   <p:stCondLst>
                                     <p:cond delay="0"/>
                                   </p:stCondLst>
                                   <p:childTnLst>
                                     <p:set>
                                       <p:cBhvr>
-                                        <p:cTn id="20" dur="1" fill="hold">
+                                        <p:cTn id="18" dur="1" fill="hold">
                                           <p:stCondLst>
                                             <p:cond delay="0"/>
                                           </p:stCondLst>
@@ -6047,26 +6029,26 @@
                     </p:cTn>
                   </p:par>
                   <p:par>
-                    <p:cTn id="21" fill="hold">
+                    <p:cTn id="19" fill="hold">
                       <p:stCondLst>
                         <p:cond delay="indefinite"/>
                       </p:stCondLst>
                       <p:childTnLst>
                         <p:par>
-                          <p:cTn id="22" fill="hold">
+                          <p:cTn id="20" fill="hold">
                             <p:stCondLst>
                               <p:cond delay="0"/>
                             </p:stCondLst>
                             <p:childTnLst>
                               <p:par>
-                                <p:cTn id="23" presetID="1" presetClass="entr" presetSubtype="0" fill="hold" nodeType="clickEffect">
+                                <p:cTn id="21" presetID="1" presetClass="entr" presetSubtype="0" fill="hold" nodeType="clickEffect">
                                   <p:stCondLst>
                                     <p:cond delay="0"/>
                                   </p:stCondLst>
                                   <p:childTnLst>
                                     <p:set>
                                       <p:cBhvr>
-                                        <p:cTn id="24" dur="1" fill="hold">
+                                        <p:cTn id="22" dur="1" fill="hold">
                                           <p:stCondLst>
                                             <p:cond delay="0"/>
                                           </p:stCondLst>
@@ -6096,26 +6078,26 @@
                     </p:cTn>
                   </p:par>
                   <p:par>
-                    <p:cTn id="25" fill="hold">
+                    <p:cTn id="23" fill="hold">
                       <p:stCondLst>
                         <p:cond delay="indefinite"/>
                       </p:stCondLst>
                       <p:childTnLst>
                         <p:par>
-                          <p:cTn id="26" fill="hold">
+                          <p:cTn id="24" fill="hold">
                             <p:stCondLst>
                               <p:cond delay="0"/>
                             </p:stCondLst>
                             <p:childTnLst>
                               <p:par>
-                                <p:cTn id="27" presetID="1" presetClass="entr" presetSubtype="0" fill="hold" nodeType="clickEffect">
+                                <p:cTn id="25" presetID="1" presetClass="entr" presetSubtype="0" fill="hold" nodeType="clickEffect">
                                   <p:stCondLst>
                                     <p:cond delay="0"/>
                                   </p:stCondLst>
                                   <p:childTnLst>
                                     <p:set>
                                       <p:cBhvr>
-                                        <p:cTn id="28" dur="1" fill="hold">
+                                        <p:cTn id="26" dur="1" fill="hold">
                                           <p:stCondLst>
                                             <p:cond delay="0"/>
                                           </p:stCondLst>
@@ -6385,55 +6367,6 @@
                                         <p:tgtEl>
                                           <p:spTgt spid="3">
                                             <p:txEl>
-                                              <p:pRg st="0" end="0"/>
-                                            </p:txEl>
-                                          </p:spTgt>
-                                        </p:tgtEl>
-                                        <p:attrNameLst>
-                                          <p:attrName>style.visibility</p:attrName>
-                                        </p:attrNameLst>
-                                      </p:cBhvr>
-                                      <p:to>
-                                        <p:strVal val="visible"/>
-                                      </p:to>
-                                    </p:set>
-                                  </p:childTnLst>
-                                </p:cTn>
-                              </p:par>
-                            </p:childTnLst>
-                          </p:cTn>
-                        </p:par>
-                      </p:childTnLst>
-                    </p:cTn>
-                  </p:par>
-                  <p:par>
-                    <p:cTn id="7" fill="hold">
-                      <p:stCondLst>
-                        <p:cond delay="indefinite"/>
-                      </p:stCondLst>
-                      <p:childTnLst>
-                        <p:par>
-                          <p:cTn id="8" fill="hold">
-                            <p:stCondLst>
-                              <p:cond delay="0"/>
-                            </p:stCondLst>
-                            <p:childTnLst>
-                              <p:par>
-                                <p:cTn id="9" presetID="1" presetClass="entr" presetSubtype="0" fill="hold" grpId="0" nodeType="clickEffect">
-                                  <p:stCondLst>
-                                    <p:cond delay="0"/>
-                                  </p:stCondLst>
-                                  <p:childTnLst>
-                                    <p:set>
-                                      <p:cBhvr>
-                                        <p:cTn id="10" dur="1" fill="hold">
-                                          <p:stCondLst>
-                                            <p:cond delay="0"/>
-                                          </p:stCondLst>
-                                        </p:cTn>
-                                        <p:tgtEl>
-                                          <p:spTgt spid="3">
-                                            <p:txEl>
                                               <p:pRg st="1" end="1"/>
                                             </p:txEl>
                                           </p:spTgt>
@@ -6449,33 +6382,15 @@
                                   </p:childTnLst>
                                 </p:cTn>
                               </p:par>
-                            </p:childTnLst>
-                          </p:cTn>
-                        </p:par>
-                      </p:childTnLst>
-                    </p:cTn>
-                  </p:par>
-                  <p:par>
-                    <p:cTn id="11" fill="hold">
-                      <p:stCondLst>
-                        <p:cond delay="indefinite"/>
-                      </p:stCondLst>
-                      <p:childTnLst>
-                        <p:par>
-                          <p:cTn id="12" fill="hold">
-                            <p:stCondLst>
-                              <p:cond delay="0"/>
-                            </p:stCondLst>
-                            <p:childTnLst>
                               <p:par>
-                                <p:cTn id="13" presetID="1" presetClass="entr" presetSubtype="0" fill="hold" grpId="0" nodeType="clickEffect">
+                                <p:cTn id="7" presetID="1" presetClass="entr" presetSubtype="0" fill="hold" grpId="0" nodeType="withEffect">
                                   <p:stCondLst>
                                     <p:cond delay="0"/>
                                   </p:stCondLst>
                                   <p:childTnLst>
                                     <p:set>
                                       <p:cBhvr>
-                                        <p:cTn id="14" dur="1" fill="hold">
+                                        <p:cTn id="8" dur="1" fill="hold">
                                           <p:stCondLst>
                                             <p:cond delay="0"/>
                                           </p:stCondLst>
@@ -6498,33 +6413,15 @@
                                   </p:childTnLst>
                                 </p:cTn>
                               </p:par>
-                            </p:childTnLst>
-                          </p:cTn>
-                        </p:par>
-                      </p:childTnLst>
-                    </p:cTn>
-                  </p:par>
-                  <p:par>
-                    <p:cTn id="15" fill="hold">
-                      <p:stCondLst>
-                        <p:cond delay="indefinite"/>
-                      </p:stCondLst>
-                      <p:childTnLst>
-                        <p:par>
-                          <p:cTn id="16" fill="hold">
-                            <p:stCondLst>
-                              <p:cond delay="0"/>
-                            </p:stCondLst>
-                            <p:childTnLst>
                               <p:par>
-                                <p:cTn id="17" presetID="1" presetClass="entr" presetSubtype="0" fill="hold" grpId="0" nodeType="clickEffect">
+                                <p:cTn id="9" presetID="1" presetClass="entr" presetSubtype="0" fill="hold" grpId="0" nodeType="withEffect">
                                   <p:stCondLst>
                                     <p:cond delay="0"/>
                                   </p:stCondLst>
                                   <p:childTnLst>
                                     <p:set>
                                       <p:cBhvr>
-                                        <p:cTn id="18" dur="1" fill="hold">
+                                        <p:cTn id="10" dur="1" fill="hold">
                                           <p:stCondLst>
                                             <p:cond delay="0"/>
                                           </p:stCondLst>
@@ -6547,33 +6444,15 @@
                                   </p:childTnLst>
                                 </p:cTn>
                               </p:par>
-                            </p:childTnLst>
-                          </p:cTn>
-                        </p:par>
-                      </p:childTnLst>
-                    </p:cTn>
-                  </p:par>
-                  <p:par>
-                    <p:cTn id="19" fill="hold">
-                      <p:stCondLst>
-                        <p:cond delay="indefinite"/>
-                      </p:stCondLst>
-                      <p:childTnLst>
-                        <p:par>
-                          <p:cTn id="20" fill="hold">
-                            <p:stCondLst>
-                              <p:cond delay="0"/>
-                            </p:stCondLst>
-                            <p:childTnLst>
                               <p:par>
-                                <p:cTn id="21" presetID="1" presetClass="entr" presetSubtype="0" fill="hold" grpId="0" nodeType="clickEffect">
+                                <p:cTn id="11" presetID="1" presetClass="entr" presetSubtype="0" fill="hold" grpId="0" nodeType="withEffect">
                                   <p:stCondLst>
                                     <p:cond delay="0"/>
                                   </p:stCondLst>
                                   <p:childTnLst>
                                     <p:set>
                                       <p:cBhvr>
-                                        <p:cTn id="22" dur="1" fill="hold">
+                                        <p:cTn id="12" dur="1" fill="hold">
                                           <p:stCondLst>
                                             <p:cond delay="0"/>
                                           </p:stCondLst>
@@ -6596,33 +6475,15 @@
                                   </p:childTnLst>
                                 </p:cTn>
                               </p:par>
-                            </p:childTnLst>
-                          </p:cTn>
-                        </p:par>
-                      </p:childTnLst>
-                    </p:cTn>
-                  </p:par>
-                  <p:par>
-                    <p:cTn id="23" fill="hold">
-                      <p:stCondLst>
-                        <p:cond delay="indefinite"/>
-                      </p:stCondLst>
-                      <p:childTnLst>
-                        <p:par>
-                          <p:cTn id="24" fill="hold">
-                            <p:stCondLst>
-                              <p:cond delay="0"/>
-                            </p:stCondLst>
-                            <p:childTnLst>
                               <p:par>
-                                <p:cTn id="25" presetID="1" presetClass="entr" presetSubtype="0" fill="hold" grpId="0" nodeType="clickEffect">
+                                <p:cTn id="13" presetID="1" presetClass="entr" presetSubtype="0" fill="hold" grpId="0" nodeType="withEffect">
                                   <p:stCondLst>
                                     <p:cond delay="0"/>
                                   </p:stCondLst>
                                   <p:childTnLst>
                                     <p:set>
                                       <p:cBhvr>
-                                        <p:cTn id="26" dur="1" fill="hold">
+                                        <p:cTn id="14" dur="1" fill="hold">
                                           <p:stCondLst>
                                             <p:cond delay="0"/>
                                           </p:stCondLst>
@@ -6673,7 +6534,7 @@
       </p:par>
     </p:tnLst>
     <p:bldLst>
-      <p:bldP spid="3" grpId="0" build="p"/>
+      <p:bldP spid="3" grpId="0" uiExpand="1" build="p"/>
     </p:bldLst>
   </p:timing>
 </p:sld>

</xml_diff>